<commit_message>
Conditionals and service locator added
</commit_message>
<xml_diff>
--- a/CDI.pptx
+++ b/CDI.pptx
@@ -5,10 +5,10 @@
     <p:sldMasterId id="2147483672" r:id="rId4"/>
   </p:sldMasterIdLst>
   <p:notesMasterIdLst>
-    <p:notesMasterId r:id="rId30"/>
+    <p:notesMasterId r:id="rId33"/>
   </p:notesMasterIdLst>
   <p:handoutMasterIdLst>
-    <p:handoutMasterId r:id="rId31"/>
+    <p:handoutMasterId r:id="rId34"/>
   </p:handoutMasterIdLst>
   <p:sldIdLst>
     <p:sldId id="282" r:id="rId5"/>
@@ -36,6 +36,9 @@
     <p:sldId id="298" r:id="rId27"/>
     <p:sldId id="301" r:id="rId28"/>
     <p:sldId id="302" r:id="rId29"/>
+    <p:sldId id="327" r:id="rId30"/>
+    <p:sldId id="326" r:id="rId31"/>
+    <p:sldId id="328" r:id="rId32"/>
   </p:sldIdLst>
   <p:sldSz cx="9144000" cy="5143500" type="screen16x9"/>
   <p:notesSz cx="6858000" cy="9144000"/>
@@ -236,7 +239,7 @@
           <a:p>
             <a:fld id="{CC3E98DD-6812-454C-AE65-FC853C04DD9F}" type="datetimeFigureOut">
               <a:rPr lang="en-NL" smtClean="0"/>
-              <a:t>28/09/2018</a:t>
+              <a:t>30/09/2018</a:t>
             </a:fld>
             <a:endParaRPr lang="en-NL"/>
           </a:p>
@@ -418,7 +421,7 @@
           <a:p>
             <a:fld id="{DDF2FCE7-7AFA-9242-BECB-A61CE0BE95A1}" type="datetimeFigureOut">
               <a:rPr lang="nl-NL" smtClean="0"/>
-              <a:t>28-9-2018</a:t>
+              <a:t>30-9-2018</a:t>
             </a:fld>
             <a:endParaRPr lang="nl-NL"/>
           </a:p>
@@ -10279,6 +10282,929 @@
     <p:extLst>
       <p:ext uri="{BB962C8B-B14F-4D97-AF65-F5344CB8AC3E}">
         <p14:creationId xmlns:p14="http://schemas.microsoft.com/office/powerpoint/2010/main" val="1245274641"/>
+      </p:ext>
+    </p:extLst>
+  </p:cSld>
+  <p:clrMapOvr>
+    <a:masterClrMapping/>
+  </p:clrMapOvr>
+</p:sld>
+</file>
+
+<file path=ppt/slides/slide26.xml><?xml version="1.0" encoding="utf-8"?>
+<p:sld xmlns:a="http://schemas.openxmlformats.org/drawingml/2006/main" xmlns:r="http://schemas.openxmlformats.org/officeDocument/2006/relationships" xmlns:p="http://schemas.openxmlformats.org/presentationml/2006/main">
+  <p:cSld>
+    <p:spTree>
+      <p:nvGrpSpPr>
+        <p:cNvPr id="1" name=""/>
+        <p:cNvGrpSpPr/>
+        <p:nvPr/>
+      </p:nvGrpSpPr>
+      <p:grpSpPr>
+        <a:xfrm>
+          <a:off x="0" y="0"/>
+          <a:ext cx="0" cy="0"/>
+          <a:chOff x="0" y="0"/>
+          <a:chExt cx="0" cy="0"/>
+        </a:xfrm>
+      </p:grpSpPr>
+      <p:sp>
+        <p:nvSpPr>
+          <p:cNvPr id="2" name="Title 1">
+            <a:extLst>
+              <a:ext uri="{FF2B5EF4-FFF2-40B4-BE49-F238E27FC236}">
+                <a16:creationId xmlns:a16="http://schemas.microsoft.com/office/drawing/2014/main" id="{C4098F99-FDF0-40E6-B0FE-9E43594E2065}"/>
+              </a:ext>
+            </a:extLst>
+          </p:cNvPr>
+          <p:cNvSpPr>
+            <a:spLocks noGrp="1"/>
+          </p:cNvSpPr>
+          <p:nvPr>
+            <p:ph type="title"/>
+          </p:nvPr>
+        </p:nvSpPr>
+        <p:spPr/>
+        <p:txBody>
+          <a:bodyPr/>
+          <a:lstStyle/>
+          <a:p>
+            <a:r>
+              <a:rPr lang="nl-NL" dirty="0" err="1"/>
+              <a:t>Conditionals</a:t>
+            </a:r>
+            <a:r>
+              <a:rPr lang="nl-NL" dirty="0"/>
+              <a:t> (Spring 4.0)</a:t>
+            </a:r>
+            <a:endParaRPr lang="en-NL" dirty="0"/>
+          </a:p>
+        </p:txBody>
+      </p:sp>
+      <p:sp>
+        <p:nvSpPr>
+          <p:cNvPr id="12" name="Slide Number Placeholder 11">
+            <a:extLst>
+              <a:ext uri="{FF2B5EF4-FFF2-40B4-BE49-F238E27FC236}">
+                <a16:creationId xmlns:a16="http://schemas.microsoft.com/office/drawing/2014/main" id="{032E80E0-A183-4562-A031-E9059E4DB0C8}"/>
+              </a:ext>
+            </a:extLst>
+          </p:cNvPr>
+          <p:cNvSpPr>
+            <a:spLocks noGrp="1"/>
+          </p:cNvSpPr>
+          <p:nvPr>
+            <p:ph type="sldNum" sz="quarter" idx="12"/>
+          </p:nvPr>
+        </p:nvSpPr>
+        <p:spPr/>
+        <p:txBody>
+          <a:bodyPr/>
+          <a:lstStyle/>
+          <a:p>
+            <a:fld id="{14F1411D-0280-154F-AEAC-4C20B7AA46B2}" type="slidenum">
+              <a:rPr lang="nl-NL" smtClean="0"/>
+              <a:t>26</a:t>
+            </a:fld>
+            <a:endParaRPr lang="nl-NL"/>
+          </a:p>
+        </p:txBody>
+      </p:sp>
+      <p:sp>
+        <p:nvSpPr>
+          <p:cNvPr id="13" name="Footer Placeholder 12">
+            <a:extLst>
+              <a:ext uri="{FF2B5EF4-FFF2-40B4-BE49-F238E27FC236}">
+                <a16:creationId xmlns:a16="http://schemas.microsoft.com/office/drawing/2014/main" id="{83852B02-92CE-47A4-9AF4-7A4B5E4BCCA0}"/>
+              </a:ext>
+            </a:extLst>
+          </p:cNvPr>
+          <p:cNvSpPr>
+            <a:spLocks noGrp="1"/>
+          </p:cNvSpPr>
+          <p:nvPr>
+            <p:ph type="ftr" sz="quarter" idx="11"/>
+          </p:nvPr>
+        </p:nvSpPr>
+        <p:spPr/>
+        <p:txBody>
+          <a:bodyPr/>
+          <a:lstStyle/>
+          <a:p>
+            <a:r>
+              <a:rPr lang="nl-NL"/>
+              <a:t>Context and dependency injection</a:t>
+            </a:r>
+          </a:p>
+        </p:txBody>
+      </p:sp>
+      <p:pic>
+        <p:nvPicPr>
+          <p:cNvPr id="5" name="Picture 4">
+            <a:extLst>
+              <a:ext uri="{FF2B5EF4-FFF2-40B4-BE49-F238E27FC236}">
+                <a16:creationId xmlns:a16="http://schemas.microsoft.com/office/drawing/2014/main" id="{19F3EC47-8B6E-49A3-8844-7E817A38E4FC}"/>
+              </a:ext>
+            </a:extLst>
+          </p:cNvPr>
+          <p:cNvPicPr>
+            <a:picLocks noChangeAspect="1"/>
+          </p:cNvPicPr>
+          <p:nvPr/>
+        </p:nvPicPr>
+        <p:blipFill>
+          <a:blip r:embed="rId2"/>
+          <a:stretch>
+            <a:fillRect/>
+          </a:stretch>
+        </p:blipFill>
+        <p:spPr>
+          <a:xfrm>
+            <a:off x="634274" y="2977381"/>
+            <a:ext cx="4086837" cy="516727"/>
+          </a:xfrm>
+          <a:prstGeom prst="rect">
+            <a:avLst/>
+          </a:prstGeom>
+        </p:spPr>
+      </p:pic>
+      <p:pic>
+        <p:nvPicPr>
+          <p:cNvPr id="8" name="Picture 7">
+            <a:extLst>
+              <a:ext uri="{FF2B5EF4-FFF2-40B4-BE49-F238E27FC236}">
+                <a16:creationId xmlns:a16="http://schemas.microsoft.com/office/drawing/2014/main" id="{D169E4F2-CCC7-4996-8CC5-8FA0A1F16130}"/>
+              </a:ext>
+            </a:extLst>
+          </p:cNvPr>
+          <p:cNvPicPr>
+            <a:picLocks noChangeAspect="1"/>
+          </p:cNvPicPr>
+          <p:nvPr/>
+        </p:nvPicPr>
+        <p:blipFill>
+          <a:blip r:embed="rId3"/>
+          <a:stretch>
+            <a:fillRect/>
+          </a:stretch>
+        </p:blipFill>
+        <p:spPr>
+          <a:xfrm>
+            <a:off x="634274" y="908527"/>
+            <a:ext cx="3922424" cy="524556"/>
+          </a:xfrm>
+          <a:prstGeom prst="rect">
+            <a:avLst/>
+          </a:prstGeom>
+        </p:spPr>
+      </p:pic>
+      <p:pic>
+        <p:nvPicPr>
+          <p:cNvPr id="11" name="Picture 10">
+            <a:extLst>
+              <a:ext uri="{FF2B5EF4-FFF2-40B4-BE49-F238E27FC236}">
+                <a16:creationId xmlns:a16="http://schemas.microsoft.com/office/drawing/2014/main" id="{781BFCBA-6AB6-41D9-88D3-3FF2777123BD}"/>
+              </a:ext>
+            </a:extLst>
+          </p:cNvPr>
+          <p:cNvPicPr>
+            <a:picLocks noChangeAspect="1"/>
+          </p:cNvPicPr>
+          <p:nvPr/>
+        </p:nvPicPr>
+        <p:blipFill>
+          <a:blip r:embed="rId4"/>
+          <a:stretch>
+            <a:fillRect/>
+          </a:stretch>
+        </p:blipFill>
+        <p:spPr>
+          <a:xfrm>
+            <a:off x="634274" y="1614128"/>
+            <a:ext cx="6999296" cy="1182208"/>
+          </a:xfrm>
+          <a:prstGeom prst="rect">
+            <a:avLst/>
+          </a:prstGeom>
+        </p:spPr>
+      </p:pic>
+      <p:pic>
+        <p:nvPicPr>
+          <p:cNvPr id="14" name="Picture 13">
+            <a:extLst>
+              <a:ext uri="{FF2B5EF4-FFF2-40B4-BE49-F238E27FC236}">
+                <a16:creationId xmlns:a16="http://schemas.microsoft.com/office/drawing/2014/main" id="{900E6814-8BDF-43D2-B166-6ABB6503917E}"/>
+              </a:ext>
+            </a:extLst>
+          </p:cNvPr>
+          <p:cNvPicPr>
+            <a:picLocks noChangeAspect="1"/>
+          </p:cNvPicPr>
+          <p:nvPr/>
+        </p:nvPicPr>
+        <p:blipFill>
+          <a:blip r:embed="rId5"/>
+          <a:stretch>
+            <a:fillRect/>
+          </a:stretch>
+        </p:blipFill>
+        <p:spPr>
+          <a:xfrm>
+            <a:off x="634274" y="3640747"/>
+            <a:ext cx="7069758" cy="1158720"/>
+          </a:xfrm>
+          <a:prstGeom prst="rect">
+            <a:avLst/>
+          </a:prstGeom>
+        </p:spPr>
+      </p:pic>
+      <p:pic>
+        <p:nvPicPr>
+          <p:cNvPr id="15" name="Picture 14">
+            <a:extLst>
+              <a:ext uri="{FF2B5EF4-FFF2-40B4-BE49-F238E27FC236}">
+                <a16:creationId xmlns:a16="http://schemas.microsoft.com/office/drawing/2014/main" id="{557FBBB8-4D9E-4B60-90A2-38DAF0FB4B9C}"/>
+              </a:ext>
+            </a:extLst>
+          </p:cNvPr>
+          <p:cNvPicPr>
+            <a:picLocks noChangeAspect="1"/>
+          </p:cNvPicPr>
+          <p:nvPr/>
+        </p:nvPicPr>
+        <p:blipFill>
+          <a:blip r:embed="rId6"/>
+          <a:stretch>
+            <a:fillRect/>
+          </a:stretch>
+        </p:blipFill>
+        <p:spPr>
+          <a:xfrm>
+            <a:off x="5271037" y="769717"/>
+            <a:ext cx="2276475" cy="600075"/>
+          </a:xfrm>
+          <a:prstGeom prst="rect">
+            <a:avLst/>
+          </a:prstGeom>
+        </p:spPr>
+      </p:pic>
+      <p:cxnSp>
+        <p:nvCxnSpPr>
+          <p:cNvPr id="16" name="Straight Arrow Connector 15">
+            <a:extLst>
+              <a:ext uri="{FF2B5EF4-FFF2-40B4-BE49-F238E27FC236}">
+                <a16:creationId xmlns:a16="http://schemas.microsoft.com/office/drawing/2014/main" id="{1C65C2EC-CE19-4B93-88AB-56A7FC6907CA}"/>
+              </a:ext>
+            </a:extLst>
+          </p:cNvPr>
+          <p:cNvCxnSpPr>
+            <a:cxnSpLocks/>
+          </p:cNvCxnSpPr>
+          <p:nvPr/>
+        </p:nvCxnSpPr>
+        <p:spPr>
+          <a:xfrm flipH="1">
+            <a:off x="2037600" y="1122878"/>
+            <a:ext cx="3233437" cy="1179377"/>
+          </a:xfrm>
+          <a:prstGeom prst="straightConnector1">
+            <a:avLst/>
+          </a:prstGeom>
+          <a:ln w="25400">
+            <a:solidFill>
+              <a:schemeClr val="accent2"/>
+            </a:solidFill>
+            <a:tailEnd type="triangle"/>
+          </a:ln>
+        </p:spPr>
+        <p:style>
+          <a:lnRef idx="1">
+            <a:schemeClr val="accent1"/>
+          </a:lnRef>
+          <a:fillRef idx="0">
+            <a:schemeClr val="accent1"/>
+          </a:fillRef>
+          <a:effectRef idx="0">
+            <a:schemeClr val="accent1"/>
+          </a:effectRef>
+          <a:fontRef idx="minor">
+            <a:schemeClr val="tx1"/>
+          </a:fontRef>
+        </p:style>
+      </p:cxnSp>
+      <p:cxnSp>
+        <p:nvCxnSpPr>
+          <p:cNvPr id="18" name="Straight Arrow Connector 17">
+            <a:extLst>
+              <a:ext uri="{FF2B5EF4-FFF2-40B4-BE49-F238E27FC236}">
+                <a16:creationId xmlns:a16="http://schemas.microsoft.com/office/drawing/2014/main" id="{066F28F0-1BAA-496D-9AE4-A89142C2C0F0}"/>
+              </a:ext>
+            </a:extLst>
+          </p:cNvPr>
+          <p:cNvCxnSpPr>
+            <a:cxnSpLocks/>
+          </p:cNvCxnSpPr>
+          <p:nvPr/>
+        </p:nvCxnSpPr>
+        <p:spPr>
+          <a:xfrm flipH="1">
+            <a:off x="2383201" y="1283250"/>
+            <a:ext cx="1" cy="353161"/>
+          </a:xfrm>
+          <a:prstGeom prst="straightConnector1">
+            <a:avLst/>
+          </a:prstGeom>
+          <a:ln w="25400">
+            <a:solidFill>
+              <a:schemeClr val="accent2"/>
+            </a:solidFill>
+            <a:tailEnd type="triangle"/>
+          </a:ln>
+        </p:spPr>
+        <p:style>
+          <a:lnRef idx="1">
+            <a:schemeClr val="accent1"/>
+          </a:lnRef>
+          <a:fillRef idx="0">
+            <a:schemeClr val="accent1"/>
+          </a:fillRef>
+          <a:effectRef idx="0">
+            <a:schemeClr val="accent1"/>
+          </a:effectRef>
+          <a:fontRef idx="minor">
+            <a:schemeClr val="tx1"/>
+          </a:fontRef>
+        </p:style>
+      </p:cxnSp>
+      <p:cxnSp>
+        <p:nvCxnSpPr>
+          <p:cNvPr id="22" name="Straight Arrow Connector 21">
+            <a:extLst>
+              <a:ext uri="{FF2B5EF4-FFF2-40B4-BE49-F238E27FC236}">
+                <a16:creationId xmlns:a16="http://schemas.microsoft.com/office/drawing/2014/main" id="{E0FEF987-67FB-4468-9B75-1885F8AEE6D6}"/>
+              </a:ext>
+            </a:extLst>
+          </p:cNvPr>
+          <p:cNvCxnSpPr>
+            <a:cxnSpLocks/>
+          </p:cNvCxnSpPr>
+          <p:nvPr/>
+        </p:nvCxnSpPr>
+        <p:spPr>
+          <a:xfrm flipH="1">
+            <a:off x="2383202" y="3287586"/>
+            <a:ext cx="1" cy="353161"/>
+          </a:xfrm>
+          <a:prstGeom prst="straightConnector1">
+            <a:avLst/>
+          </a:prstGeom>
+          <a:ln w="25400">
+            <a:solidFill>
+              <a:schemeClr val="accent2"/>
+            </a:solidFill>
+            <a:tailEnd type="triangle"/>
+          </a:ln>
+        </p:spPr>
+        <p:style>
+          <a:lnRef idx="1">
+            <a:schemeClr val="accent1"/>
+          </a:lnRef>
+          <a:fillRef idx="0">
+            <a:schemeClr val="accent1"/>
+          </a:fillRef>
+          <a:effectRef idx="0">
+            <a:schemeClr val="accent1"/>
+          </a:effectRef>
+          <a:fontRef idx="minor">
+            <a:schemeClr val="tx1"/>
+          </a:fontRef>
+        </p:style>
+      </p:cxnSp>
+    </p:spTree>
+    <p:extLst>
+      <p:ext uri="{BB962C8B-B14F-4D97-AF65-F5344CB8AC3E}">
+        <p14:creationId xmlns:p14="http://schemas.microsoft.com/office/powerpoint/2010/main" val="4221208712"/>
+      </p:ext>
+    </p:extLst>
+  </p:cSld>
+  <p:clrMapOvr>
+    <a:masterClrMapping/>
+  </p:clrMapOvr>
+</p:sld>
+</file>
+
+<file path=ppt/slides/slide27.xml><?xml version="1.0" encoding="utf-8"?>
+<p:sld xmlns:a="http://schemas.openxmlformats.org/drawingml/2006/main" xmlns:r="http://schemas.openxmlformats.org/officeDocument/2006/relationships" xmlns:p="http://schemas.openxmlformats.org/presentationml/2006/main">
+  <p:cSld>
+    <p:spTree>
+      <p:nvGrpSpPr>
+        <p:cNvPr id="1" name=""/>
+        <p:cNvGrpSpPr/>
+        <p:nvPr/>
+      </p:nvGrpSpPr>
+      <p:grpSpPr>
+        <a:xfrm>
+          <a:off x="0" y="0"/>
+          <a:ext cx="0" cy="0"/>
+          <a:chOff x="0" y="0"/>
+          <a:chExt cx="0" cy="0"/>
+        </a:xfrm>
+      </p:grpSpPr>
+      <p:sp>
+        <p:nvSpPr>
+          <p:cNvPr id="2" name="Title 1">
+            <a:extLst>
+              <a:ext uri="{FF2B5EF4-FFF2-40B4-BE49-F238E27FC236}">
+                <a16:creationId xmlns:a16="http://schemas.microsoft.com/office/drawing/2014/main" id="{14FCFDB6-E82B-4502-95B5-3815DDA92297}"/>
+              </a:ext>
+            </a:extLst>
+          </p:cNvPr>
+          <p:cNvSpPr>
+            <a:spLocks noGrp="1"/>
+          </p:cNvSpPr>
+          <p:nvPr>
+            <p:ph type="title"/>
+          </p:nvPr>
+        </p:nvSpPr>
+        <p:spPr/>
+        <p:txBody>
+          <a:bodyPr/>
+          <a:lstStyle/>
+          <a:p>
+            <a:r>
+              <a:rPr lang="nl-NL" dirty="0" err="1"/>
+              <a:t>ServiceLocatorFactory</a:t>
+            </a:r>
+            <a:r>
+              <a:rPr lang="nl-NL" dirty="0"/>
+              <a:t>: </a:t>
+            </a:r>
+            <a:r>
+              <a:rPr lang="nl-NL" dirty="0" err="1"/>
+              <a:t>determine</a:t>
+            </a:r>
+            <a:r>
+              <a:rPr lang="nl-NL" dirty="0"/>
+              <a:t> </a:t>
+            </a:r>
+            <a:r>
+              <a:rPr lang="nl-NL" dirty="0" err="1"/>
+              <a:t>bean</a:t>
+            </a:r>
+            <a:r>
+              <a:rPr lang="nl-NL" dirty="0"/>
+              <a:t> at </a:t>
+            </a:r>
+            <a:r>
+              <a:rPr lang="nl-NL" dirty="0" err="1"/>
+              <a:t>runtime</a:t>
+            </a:r>
+            <a:endParaRPr lang="en-NL" dirty="0"/>
+          </a:p>
+        </p:txBody>
+      </p:sp>
+      <p:sp>
+        <p:nvSpPr>
+          <p:cNvPr id="12" name="Slide Number Placeholder 11">
+            <a:extLst>
+              <a:ext uri="{FF2B5EF4-FFF2-40B4-BE49-F238E27FC236}">
+                <a16:creationId xmlns:a16="http://schemas.microsoft.com/office/drawing/2014/main" id="{184C4772-4E23-4140-8D11-6B3E22E13DD6}"/>
+              </a:ext>
+            </a:extLst>
+          </p:cNvPr>
+          <p:cNvSpPr>
+            <a:spLocks noGrp="1"/>
+          </p:cNvSpPr>
+          <p:nvPr>
+            <p:ph type="sldNum" sz="quarter" idx="12"/>
+          </p:nvPr>
+        </p:nvSpPr>
+        <p:spPr/>
+        <p:txBody>
+          <a:bodyPr/>
+          <a:lstStyle/>
+          <a:p>
+            <a:fld id="{14F1411D-0280-154F-AEAC-4C20B7AA46B2}" type="slidenum">
+              <a:rPr lang="nl-NL" smtClean="0"/>
+              <a:t>27</a:t>
+            </a:fld>
+            <a:endParaRPr lang="nl-NL"/>
+          </a:p>
+        </p:txBody>
+      </p:sp>
+      <p:sp>
+        <p:nvSpPr>
+          <p:cNvPr id="13" name="Footer Placeholder 12">
+            <a:extLst>
+              <a:ext uri="{FF2B5EF4-FFF2-40B4-BE49-F238E27FC236}">
+                <a16:creationId xmlns:a16="http://schemas.microsoft.com/office/drawing/2014/main" id="{056F5E68-BDB8-4DE3-BEDE-D9EA4F9F582A}"/>
+              </a:ext>
+            </a:extLst>
+          </p:cNvPr>
+          <p:cNvSpPr>
+            <a:spLocks noGrp="1"/>
+          </p:cNvSpPr>
+          <p:nvPr>
+            <p:ph type="ftr" sz="quarter" idx="11"/>
+          </p:nvPr>
+        </p:nvSpPr>
+        <p:spPr/>
+        <p:txBody>
+          <a:bodyPr/>
+          <a:lstStyle/>
+          <a:p>
+            <a:r>
+              <a:rPr lang="nl-NL"/>
+              <a:t>Context and dependency injection</a:t>
+            </a:r>
+          </a:p>
+        </p:txBody>
+      </p:sp>
+      <p:pic>
+        <p:nvPicPr>
+          <p:cNvPr id="4" name="Picture 3">
+            <a:extLst>
+              <a:ext uri="{FF2B5EF4-FFF2-40B4-BE49-F238E27FC236}">
+                <a16:creationId xmlns:a16="http://schemas.microsoft.com/office/drawing/2014/main" id="{B64FB9B0-7790-4451-BE02-B1B8D2D67C09}"/>
+              </a:ext>
+            </a:extLst>
+          </p:cNvPr>
+          <p:cNvPicPr>
+            <a:picLocks noChangeAspect="1"/>
+          </p:cNvPicPr>
+          <p:nvPr/>
+        </p:nvPicPr>
+        <p:blipFill>
+          <a:blip r:embed="rId2"/>
+          <a:stretch>
+            <a:fillRect/>
+          </a:stretch>
+        </p:blipFill>
+        <p:spPr>
+          <a:xfrm>
+            <a:off x="719999" y="3022829"/>
+            <a:ext cx="3514725" cy="1038225"/>
+          </a:xfrm>
+          <a:prstGeom prst="rect">
+            <a:avLst/>
+          </a:prstGeom>
+        </p:spPr>
+      </p:pic>
+      <p:pic>
+        <p:nvPicPr>
+          <p:cNvPr id="11" name="Picture 10">
+            <a:extLst>
+              <a:ext uri="{FF2B5EF4-FFF2-40B4-BE49-F238E27FC236}">
+                <a16:creationId xmlns:a16="http://schemas.microsoft.com/office/drawing/2014/main" id="{02C83805-75EF-4398-9953-1D7630C960A8}"/>
+              </a:ext>
+            </a:extLst>
+          </p:cNvPr>
+          <p:cNvPicPr>
+            <a:picLocks noChangeAspect="1"/>
+          </p:cNvPicPr>
+          <p:nvPr/>
+        </p:nvPicPr>
+        <p:blipFill>
+          <a:blip r:embed="rId3"/>
+          <a:stretch>
+            <a:fillRect/>
+          </a:stretch>
+        </p:blipFill>
+        <p:spPr>
+          <a:xfrm>
+            <a:off x="719998" y="1976706"/>
+            <a:ext cx="5324475" cy="628650"/>
+          </a:xfrm>
+          <a:prstGeom prst="rect">
+            <a:avLst/>
+          </a:prstGeom>
+        </p:spPr>
+      </p:pic>
+      <p:pic>
+        <p:nvPicPr>
+          <p:cNvPr id="15" name="Picture 14">
+            <a:extLst>
+              <a:ext uri="{FF2B5EF4-FFF2-40B4-BE49-F238E27FC236}">
+                <a16:creationId xmlns:a16="http://schemas.microsoft.com/office/drawing/2014/main" id="{AF9A67A8-83BD-4C15-8668-A1C0CED5CC36}"/>
+              </a:ext>
+            </a:extLst>
+          </p:cNvPr>
+          <p:cNvPicPr>
+            <a:picLocks noChangeAspect="1"/>
+          </p:cNvPicPr>
+          <p:nvPr/>
+        </p:nvPicPr>
+        <p:blipFill>
+          <a:blip r:embed="rId4"/>
+          <a:stretch>
+            <a:fillRect/>
+          </a:stretch>
+        </p:blipFill>
+        <p:spPr>
+          <a:xfrm>
+            <a:off x="719999" y="997035"/>
+            <a:ext cx="5324475" cy="662858"/>
+          </a:xfrm>
+          <a:prstGeom prst="rect">
+            <a:avLst/>
+          </a:prstGeom>
+        </p:spPr>
+      </p:pic>
+      <p:sp>
+        <p:nvSpPr>
+          <p:cNvPr id="16" name="Arrow: Right 15">
+            <a:extLst>
+              <a:ext uri="{FF2B5EF4-FFF2-40B4-BE49-F238E27FC236}">
+                <a16:creationId xmlns:a16="http://schemas.microsoft.com/office/drawing/2014/main" id="{2FB9804D-ADCD-4752-A8FA-893E3E53BA1E}"/>
+              </a:ext>
+            </a:extLst>
+          </p:cNvPr>
+          <p:cNvSpPr/>
+          <p:nvPr/>
+        </p:nvSpPr>
+        <p:spPr>
+          <a:xfrm>
+            <a:off x="4636239" y="3199284"/>
+            <a:ext cx="546078" cy="484632"/>
+          </a:xfrm>
+          <a:prstGeom prst="rightArrow">
+            <a:avLst/>
+          </a:prstGeom>
+          <a:solidFill>
+            <a:schemeClr val="tx2"/>
+          </a:solidFill>
+          <a:ln>
+            <a:solidFill>
+              <a:schemeClr val="tx2"/>
+            </a:solidFill>
+          </a:ln>
+        </p:spPr>
+        <p:style>
+          <a:lnRef idx="2">
+            <a:schemeClr val="accent1">
+              <a:shade val="50000"/>
+            </a:schemeClr>
+          </a:lnRef>
+          <a:fillRef idx="1">
+            <a:schemeClr val="accent1"/>
+          </a:fillRef>
+          <a:effectRef idx="0">
+            <a:schemeClr val="accent1"/>
+          </a:effectRef>
+          <a:fontRef idx="minor">
+            <a:schemeClr val="lt1"/>
+          </a:fontRef>
+        </p:style>
+        <p:txBody>
+          <a:bodyPr rtlCol="0" anchor="ctr"/>
+          <a:lstStyle/>
+          <a:p>
+            <a:pPr algn="ctr"/>
+            <a:endParaRPr lang="en-NL"/>
+          </a:p>
+        </p:txBody>
+      </p:sp>
+      <p:sp>
+        <p:nvSpPr>
+          <p:cNvPr id="17" name="TextBox 16">
+            <a:extLst>
+              <a:ext uri="{FF2B5EF4-FFF2-40B4-BE49-F238E27FC236}">
+                <a16:creationId xmlns:a16="http://schemas.microsoft.com/office/drawing/2014/main" id="{F015D9F1-CAF4-4A77-A01E-2570D0F1484B}"/>
+              </a:ext>
+            </a:extLst>
+          </p:cNvPr>
+          <p:cNvSpPr txBox="1"/>
+          <p:nvPr/>
+        </p:nvSpPr>
+        <p:spPr>
+          <a:xfrm>
+            <a:off x="5378400" y="3199284"/>
+            <a:ext cx="2404800" cy="600164"/>
+          </a:xfrm>
+          <a:prstGeom prst="rect">
+            <a:avLst/>
+          </a:prstGeom>
+          <a:noFill/>
+        </p:spPr>
+        <p:txBody>
+          <a:bodyPr wrap="square" lIns="0" tIns="0" rIns="0" bIns="0" rtlCol="0">
+            <a:spAutoFit/>
+          </a:bodyPr>
+          <a:lstStyle/>
+          <a:p>
+            <a:r>
+              <a:rPr lang="nl-NL" sz="1300" dirty="0" err="1"/>
+              <a:t>Registered</a:t>
+            </a:r>
+            <a:r>
+              <a:rPr lang="nl-NL" sz="1300" dirty="0"/>
+              <a:t> in </a:t>
+            </a:r>
+            <a:r>
+              <a:rPr lang="nl-NL" sz="1300" dirty="0" err="1"/>
+              <a:t>ServiceLocatorFactoryBean</a:t>
+            </a:r>
+            <a:endParaRPr lang="nl-NL" sz="1300" dirty="0"/>
+          </a:p>
+          <a:p>
+            <a:r>
+              <a:rPr lang="nl-NL" sz="1300" dirty="0"/>
+              <a:t>on next slide!</a:t>
+            </a:r>
+            <a:endParaRPr lang="en-NL" sz="1300" dirty="0" err="1"/>
+          </a:p>
+        </p:txBody>
+      </p:sp>
+    </p:spTree>
+    <p:extLst>
+      <p:ext uri="{BB962C8B-B14F-4D97-AF65-F5344CB8AC3E}">
+        <p14:creationId xmlns:p14="http://schemas.microsoft.com/office/powerpoint/2010/main" val="3224900466"/>
+      </p:ext>
+    </p:extLst>
+  </p:cSld>
+  <p:clrMapOvr>
+    <a:masterClrMapping/>
+  </p:clrMapOvr>
+</p:sld>
+</file>
+
+<file path=ppt/slides/slide28.xml><?xml version="1.0" encoding="utf-8"?>
+<p:sld xmlns:a="http://schemas.openxmlformats.org/drawingml/2006/main" xmlns:r="http://schemas.openxmlformats.org/officeDocument/2006/relationships" xmlns:p="http://schemas.openxmlformats.org/presentationml/2006/main">
+  <p:cSld>
+    <p:spTree>
+      <p:nvGrpSpPr>
+        <p:cNvPr id="1" name=""/>
+        <p:cNvGrpSpPr/>
+        <p:nvPr/>
+      </p:nvGrpSpPr>
+      <p:grpSpPr>
+        <a:xfrm>
+          <a:off x="0" y="0"/>
+          <a:ext cx="0" cy="0"/>
+          <a:chOff x="0" y="0"/>
+          <a:chExt cx="0" cy="0"/>
+        </a:xfrm>
+      </p:grpSpPr>
+      <p:sp>
+        <p:nvSpPr>
+          <p:cNvPr id="2" name="Title 1">
+            <a:extLst>
+              <a:ext uri="{FF2B5EF4-FFF2-40B4-BE49-F238E27FC236}">
+                <a16:creationId xmlns:a16="http://schemas.microsoft.com/office/drawing/2014/main" id="{14FCFDB6-E82B-4502-95B5-3815DDA92297}"/>
+              </a:ext>
+            </a:extLst>
+          </p:cNvPr>
+          <p:cNvSpPr>
+            <a:spLocks noGrp="1"/>
+          </p:cNvSpPr>
+          <p:nvPr>
+            <p:ph type="title"/>
+          </p:nvPr>
+        </p:nvSpPr>
+        <p:spPr/>
+        <p:txBody>
+          <a:bodyPr/>
+          <a:lstStyle/>
+          <a:p>
+            <a:r>
+              <a:rPr lang="nl-NL" dirty="0" err="1"/>
+              <a:t>ServiceLocatorFactory</a:t>
+            </a:r>
+            <a:r>
+              <a:rPr lang="nl-NL" dirty="0"/>
+              <a:t>: </a:t>
+            </a:r>
+            <a:r>
+              <a:rPr lang="nl-NL" dirty="0" err="1"/>
+              <a:t>determine</a:t>
+            </a:r>
+            <a:r>
+              <a:rPr lang="nl-NL" dirty="0"/>
+              <a:t> </a:t>
+            </a:r>
+            <a:r>
+              <a:rPr lang="nl-NL" dirty="0" err="1"/>
+              <a:t>bean</a:t>
+            </a:r>
+            <a:r>
+              <a:rPr lang="nl-NL" dirty="0"/>
+              <a:t> at </a:t>
+            </a:r>
+            <a:r>
+              <a:rPr lang="nl-NL" dirty="0" err="1"/>
+              <a:t>runtime</a:t>
+            </a:r>
+            <a:endParaRPr lang="en-NL" dirty="0"/>
+          </a:p>
+        </p:txBody>
+      </p:sp>
+      <p:pic>
+        <p:nvPicPr>
+          <p:cNvPr id="3" name="Picture 2">
+            <a:extLst>
+              <a:ext uri="{FF2B5EF4-FFF2-40B4-BE49-F238E27FC236}">
+                <a16:creationId xmlns:a16="http://schemas.microsoft.com/office/drawing/2014/main" id="{4DD4B3CB-740F-4754-9F06-6839A9759DAB}"/>
+              </a:ext>
+            </a:extLst>
+          </p:cNvPr>
+          <p:cNvPicPr>
+            <a:picLocks noChangeAspect="1"/>
+          </p:cNvPicPr>
+          <p:nvPr/>
+        </p:nvPicPr>
+        <p:blipFill>
+          <a:blip r:embed="rId2"/>
+          <a:stretch>
+            <a:fillRect/>
+          </a:stretch>
+        </p:blipFill>
+        <p:spPr>
+          <a:xfrm>
+            <a:off x="687430" y="896593"/>
+            <a:ext cx="6917005" cy="1675157"/>
+          </a:xfrm>
+          <a:prstGeom prst="rect">
+            <a:avLst/>
+          </a:prstGeom>
+        </p:spPr>
+      </p:pic>
+      <p:pic>
+        <p:nvPicPr>
+          <p:cNvPr id="5" name="Picture 4">
+            <a:extLst>
+              <a:ext uri="{FF2B5EF4-FFF2-40B4-BE49-F238E27FC236}">
+                <a16:creationId xmlns:a16="http://schemas.microsoft.com/office/drawing/2014/main" id="{253869DC-70FB-47FB-9BA3-D1630E066DB1}"/>
+              </a:ext>
+            </a:extLst>
+          </p:cNvPr>
+          <p:cNvPicPr>
+            <a:picLocks noChangeAspect="1"/>
+          </p:cNvPicPr>
+          <p:nvPr/>
+        </p:nvPicPr>
+        <p:blipFill>
+          <a:blip r:embed="rId3"/>
+          <a:stretch>
+            <a:fillRect/>
+          </a:stretch>
+        </p:blipFill>
+        <p:spPr>
+          <a:xfrm>
+            <a:off x="1742400" y="2701450"/>
+            <a:ext cx="6656569" cy="1942385"/>
+          </a:xfrm>
+          <a:prstGeom prst="rect">
+            <a:avLst/>
+          </a:prstGeom>
+        </p:spPr>
+      </p:pic>
+      <p:cxnSp>
+        <p:nvCxnSpPr>
+          <p:cNvPr id="7" name="Straight Connector 6">
+            <a:extLst>
+              <a:ext uri="{FF2B5EF4-FFF2-40B4-BE49-F238E27FC236}">
+                <a16:creationId xmlns:a16="http://schemas.microsoft.com/office/drawing/2014/main" id="{08C0AD0D-E4A3-49B1-8B59-1DFBF0BD845E}"/>
+              </a:ext>
+            </a:extLst>
+          </p:cNvPr>
+          <p:cNvCxnSpPr>
+            <a:cxnSpLocks/>
+          </p:cNvCxnSpPr>
+          <p:nvPr/>
+        </p:nvCxnSpPr>
+        <p:spPr>
+          <a:xfrm>
+            <a:off x="2858400" y="2239200"/>
+            <a:ext cx="3412800" cy="0"/>
+          </a:xfrm>
+          <a:prstGeom prst="line">
+            <a:avLst/>
+          </a:prstGeom>
+          <a:ln>
+            <a:solidFill>
+              <a:schemeClr val="tx2"/>
+            </a:solidFill>
+          </a:ln>
+        </p:spPr>
+        <p:style>
+          <a:lnRef idx="3">
+            <a:schemeClr val="dk1"/>
+          </a:lnRef>
+          <a:fillRef idx="0">
+            <a:schemeClr val="dk1"/>
+          </a:fillRef>
+          <a:effectRef idx="2">
+            <a:schemeClr val="dk1"/>
+          </a:effectRef>
+          <a:fontRef idx="minor">
+            <a:schemeClr val="tx1"/>
+          </a:fontRef>
+        </p:style>
+      </p:cxnSp>
+    </p:spTree>
+    <p:extLst>
+      <p:ext uri="{BB962C8B-B14F-4D97-AF65-F5344CB8AC3E}">
+        <p14:creationId xmlns:p14="http://schemas.microsoft.com/office/powerpoint/2010/main" val="1348702309"/>
       </p:ext>
     </p:extLst>
   </p:cSld>
@@ -12770,15 +13696,6 @@
 </file>
 
 <file path=customXml/item1.xml><?xml version="1.0" encoding="utf-8"?>
-<?mso-contentType ?>
-<FormTemplates xmlns="http://schemas.microsoft.com/sharepoint/v3/contenttype/forms">
-  <Display>DocumentLibraryForm</Display>
-  <Edit>DocumentLibraryForm</Edit>
-  <New>DocumentLibraryForm</New>
-</FormTemplates>
-</file>
-
-<file path=customXml/item2.xml><?xml version="1.0" encoding="utf-8"?>
 <ct:contentTypeSchema xmlns:ct="http://schemas.microsoft.com/office/2006/metadata/contentType" xmlns:ma="http://schemas.microsoft.com/office/2006/metadata/properties/metaAttributes" ct:_="" ma:_="" ma:contentTypeName="Document" ma:contentTypeID="0x010100E60B9E64A7B90B499F767EB2F0BD9B16" ma:contentTypeVersion="4" ma:contentTypeDescription="Een nieuw document maken." ma:contentTypeScope="" ma:versionID="890a625500243192203a5f75e70e3187">
   <xsd:schema xmlns:xsd="http://www.w3.org/2001/XMLSchema" xmlns:xs="http://www.w3.org/2001/XMLSchema" xmlns:p="http://schemas.microsoft.com/office/2006/metadata/properties" xmlns:ns2="bd3a200e-a112-4432-b134-79c9e3991b87" targetNamespace="http://schemas.microsoft.com/office/2006/metadata/properties" ma:root="true" ma:fieldsID="19c006e645b1596e83fa8f4c2bdffb76" ns2:_="">
     <xsd:import namespace="bd3a200e-a112-4432-b134-79c9e3991b87"/>
@@ -12922,6 +13839,15 @@
 </ct:contentTypeSchema>
 </file>
 
+<file path=customXml/item2.xml><?xml version="1.0" encoding="utf-8"?>
+<?mso-contentType ?>
+<FormTemplates xmlns="http://schemas.microsoft.com/sharepoint/v3/contenttype/forms">
+  <Display>DocumentLibraryForm</Display>
+  <Edit>DocumentLibraryForm</Edit>
+  <New>DocumentLibraryForm</New>
+</FormTemplates>
+</file>
+
 <file path=customXml/item3.xml><?xml version="1.0" encoding="utf-8"?>
 <p:properties xmlns:p="http://schemas.microsoft.com/office/2006/metadata/properties" xmlns:xsi="http://www.w3.org/2001/XMLSchema-instance" xmlns:pc="http://schemas.microsoft.com/office/infopath/2007/PartnerControls">
   <documentManagement/>
@@ -12929,14 +13855,6 @@
 </file>
 
 <file path=customXml/itemProps1.xml><?xml version="1.0" encoding="utf-8"?>
-<ds:datastoreItem xmlns:ds="http://schemas.openxmlformats.org/officeDocument/2006/customXml" ds:itemID="{87F52C54-E7F0-4533-A258-2B00DF9E8BD3}">
-  <ds:schemaRefs>
-    <ds:schemaRef ds:uri="http://schemas.microsoft.com/sharepoint/v3/contenttype/forms"/>
-  </ds:schemaRefs>
-</ds:datastoreItem>
-</file>
-
-<file path=customXml/itemProps2.xml><?xml version="1.0" encoding="utf-8"?>
 <ds:datastoreItem xmlns:ds="http://schemas.openxmlformats.org/officeDocument/2006/customXml" ds:itemID="{5E0BD5BC-1318-4595-A8BB-C1045EDC5470}">
   <ds:schemaRefs>
     <ds:schemaRef ds:uri="http://schemas.microsoft.com/office/2006/metadata/contentType"/>
@@ -12950,6 +13868,14 @@
     <ds:schemaRef ds:uri="http://purl.org/dc/elements/1.1/"/>
     <ds:schemaRef ds:uri="http://purl.org/dc/terms/"/>
     <ds:schemaRef ds:uri="http://schemas.microsoft.com/internal/obd"/>
+  </ds:schemaRefs>
+</ds:datastoreItem>
+</file>
+
+<file path=customXml/itemProps2.xml><?xml version="1.0" encoding="utf-8"?>
+<ds:datastoreItem xmlns:ds="http://schemas.openxmlformats.org/officeDocument/2006/customXml" ds:itemID="{87F52C54-E7F0-4533-A258-2B00DF9E8BD3}">
+  <ds:schemaRefs>
+    <ds:schemaRef ds:uri="http://schemas.microsoft.com/sharepoint/v3/contenttype/forms"/>
   </ds:schemaRefs>
 </ds:datastoreItem>
 </file>

</xml_diff>